<commit_message>
fixed stft graph and poster link
</commit_message>
<xml_diff>
--- a/poster.pptx
+++ b/poster.pptx
@@ -4616,7 +4616,7 @@
                 </a:solidFill>
                 <a:latin typeface="Arial" charset="0"/>
                 <a:cs typeface="Arial" charset="0"/>
-                <a:hlinkClick r:id="rId9" action="ppaction://hlinkfile"/>
+                <a:hlinkClick r:id="rId9"/>
               </a:rPr>
               <a:t>github.com/</a:t>
             </a:r>
@@ -4630,7 +4630,7 @@
                 </a:solidFill>
                 <a:latin typeface="Arial" charset="0"/>
                 <a:cs typeface="Arial" charset="0"/>
-                <a:hlinkClick r:id="rId9" action="ppaction://hlinkfile"/>
+                <a:hlinkClick r:id="rId9"/>
               </a:rPr>
               <a:t>OliverIgnetik</a:t>
             </a:r>

</xml_diff>

<commit_message>
Incorporated feedback from draft review
</commit_message>
<xml_diff>
--- a/poster.pptx
+++ b/poster.pptx
@@ -2402,7 +2402,7 @@
         <p:spPr>
           <a:xfrm>
             <a:off x="15827206" y="38165224"/>
-            <a:ext cx="13499839" cy="2246769"/>
+            <a:ext cx="13499839" cy="2893100"/>
           </a:xfrm>
           <a:prstGeom prst="rect">
             <a:avLst/>
@@ -2416,7 +2416,7 @@
           <a:p>
             <a:pPr marL="731838" indent="-731838"/>
             <a:r>
-              <a:rPr lang="en-GB" sz="2800" b="0" dirty="0">
+              <a:rPr lang="en-GB" sz="2600" b="0" dirty="0">
                 <a:solidFill>
                   <a:srgbClr val="333333"/>
                 </a:solidFill>
@@ -2426,7 +2426,7 @@
               <a:t>[1] M. Müller, D. P. Ellis, A. </a:t>
             </a:r>
             <a:r>
-              <a:rPr lang="en-GB" sz="2800" b="0" dirty="0" err="1">
+              <a:rPr lang="en-GB" sz="2600" b="0" dirty="0" err="1">
                 <a:solidFill>
                   <a:srgbClr val="333333"/>
                 </a:solidFill>
@@ -2436,7 +2436,7 @@
               <a:t>Klapuri</a:t>
             </a:r>
             <a:r>
-              <a:rPr lang="en-GB" sz="2800" b="0" dirty="0">
+              <a:rPr lang="en-GB" sz="2600" b="0" dirty="0">
                 <a:solidFill>
                   <a:srgbClr val="333333"/>
                 </a:solidFill>
@@ -2449,7 +2449,7 @@
           <a:p>
             <a:pPr marL="731838" indent="-731838"/>
             <a:r>
-              <a:rPr lang="en-GB" sz="2800" b="0" dirty="0">
+              <a:rPr lang="en-GB" sz="2600" b="0" dirty="0">
                 <a:solidFill>
                   <a:srgbClr val="333333"/>
                 </a:solidFill>
@@ -2462,7 +2462,7 @@
           <a:p>
             <a:pPr marL="731838" indent="-731838"/>
             <a:r>
-              <a:rPr lang="en-GB" sz="2800" b="0" dirty="0">
+              <a:rPr lang="en-GB" sz="2600" b="0" dirty="0">
                 <a:solidFill>
                   <a:srgbClr val="333333"/>
                 </a:solidFill>
@@ -2471,7 +2471,7 @@
               </a:rPr>
               <a:t>2011.</a:t>
             </a:r>
-            <a:endParaRPr lang="en-AU" sz="2800" b="0" dirty="0">
+            <a:endParaRPr lang="en-AU" sz="2600" b="0" dirty="0">
               <a:solidFill>
                 <a:srgbClr val="333333"/>
               </a:solidFill>
@@ -2482,7 +2482,7 @@
           <a:p>
             <a:pPr marL="731838" indent="-731838"/>
             <a:r>
-              <a:rPr lang="en-AU" sz="2800" b="0" dirty="0">
+              <a:rPr lang="en-AU" sz="2600" b="0" dirty="0">
                 <a:solidFill>
                   <a:srgbClr val="333333"/>
                 </a:solidFill>
@@ -2492,7 +2492,7 @@
               <a:t>[2] </a:t>
             </a:r>
             <a:r>
-              <a:rPr lang="en-GB" sz="2800" b="0" dirty="0">
+              <a:rPr lang="en-GB" sz="2600" b="0" dirty="0">
                 <a:solidFill>
                   <a:srgbClr val="333333"/>
                 </a:solidFill>
@@ -2502,7 +2502,7 @@
               <a:t>E. </a:t>
             </a:r>
             <a:r>
-              <a:rPr lang="en-GB" sz="2800" b="0" dirty="0" err="1">
+              <a:rPr lang="en-GB" sz="2600" b="0" dirty="0" err="1">
                 <a:solidFill>
                   <a:srgbClr val="333333"/>
                 </a:solidFill>
@@ -2512,7 +2512,7 @@
               <a:t>Benetos</a:t>
             </a:r>
             <a:r>
-              <a:rPr lang="en-GB" sz="2800" b="0" dirty="0">
+              <a:rPr lang="en-GB" sz="2600" b="0" dirty="0">
                 <a:solidFill>
                   <a:srgbClr val="333333"/>
                 </a:solidFill>
@@ -2525,7 +2525,7 @@
           <a:p>
             <a:pPr marL="731838" indent="-731838"/>
             <a:r>
-              <a:rPr lang="en-GB" sz="2800" b="0" dirty="0">
+              <a:rPr lang="en-GB" sz="2600" b="0" dirty="0">
                 <a:solidFill>
                   <a:srgbClr val="333333"/>
                 </a:solidFill>
@@ -2534,6 +2534,29 @@
               </a:rPr>
               <a:t>University of Singapore, University of London, January 2019</a:t>
             </a:r>
+          </a:p>
+          <a:p>
+            <a:pPr marL="731838" indent="-731838"/>
+            <a:r>
+              <a:rPr lang="en-GB" sz="2600" b="0" dirty="0">
+                <a:solidFill>
+                  <a:srgbClr val="333333"/>
+                </a:solidFill>
+                <a:latin typeface="Arial" panose="020B0604020202020204" pitchFamily="34" charset="0"/>
+                <a:cs typeface="Arial" panose="020B0604020202020204" pitchFamily="34" charset="0"/>
+              </a:rPr>
+              <a:t>[3] L. Li, I. Ni, and L. Yang, “Music transcription using deep learning”, 2019.</a:t>
+            </a:r>
+          </a:p>
+          <a:p>
+            <a:pPr marL="731838" indent="-731838"/>
+            <a:endParaRPr lang="en-GB" sz="2600" b="0" dirty="0">
+              <a:solidFill>
+                <a:srgbClr val="333333"/>
+              </a:solidFill>
+              <a:latin typeface="Arial" panose="020B0604020202020204" pitchFamily="34" charset="0"/>
+              <a:cs typeface="Arial" panose="020B0604020202020204" pitchFamily="34" charset="0"/>
+            </a:endParaRPr>
           </a:p>
         </p:txBody>
       </p:sp>
@@ -3152,7 +3175,7 @@
                 <a:latin typeface="Arial" pitchFamily="34" charset="0"/>
                 <a:cs typeface="Arial" pitchFamily="34" charset="0"/>
               </a:rPr>
-              <a:t>Overall accuracy achieved of 1.0 </a:t>
+              <a:t>Overall accuracy achieved of 1.0 (100%)</a:t>
             </a:r>
           </a:p>
           <a:p>
@@ -3196,7 +3219,7 @@
                 <a:latin typeface="Arial" pitchFamily="34" charset="0"/>
                 <a:cs typeface="Arial" pitchFamily="34" charset="0"/>
               </a:rPr>
-              <a:t>F-measure achieved of 0.75 </a:t>
+              <a:t>F-measure achieved of 0.75 (75%)</a:t>
             </a:r>
           </a:p>
           <a:p>
@@ -3635,7 +3658,7 @@
                 <a:latin typeface="Arial" pitchFamily="34" charset="0"/>
                 <a:cs typeface="Arial" pitchFamily="34" charset="0"/>
               </a:rPr>
-              <a:t>NMF model had a high accuracy in a simple monophonic transcription task but needs extension to polyphonic cases</a:t>
+              <a:t>NMF model had an accuracy of 1.0 in a simple monophonic transcription task but needs extension to polyphonic cases</a:t>
             </a:r>
           </a:p>
           <a:p>
@@ -3667,7 +3690,7 @@
                 <a:latin typeface="Arial" pitchFamily="34" charset="0"/>
                 <a:cs typeface="Arial" pitchFamily="34" charset="0"/>
               </a:rPr>
-              <a:t>The NN model outperformed a similar model in a paper by Li et al (2019) in which a regular binary entropy loss function is used</a:t>
+              <a:t>The NN model outperformed a similar model in a paper by Li et al [3] in which a regular binary entropy loss function is used</a:t>
             </a:r>
           </a:p>
         </p:txBody>
@@ -3887,7 +3910,27 @@
                 <a:latin typeface="Arial" pitchFamily="34" charset="0"/>
                 <a:cs typeface="Arial" pitchFamily="34" charset="0"/>
               </a:rPr>
-              <a:t>NN model takes a lot of time to train but performed well in polyphonic case. In the future temporal dependencies may be included through the use of different architectures</a:t>
+              <a:t>NN model takes a lot of time to train but performed well in polyphonic case. In </a:t>
+            </a:r>
+            <a:r>
+              <a:rPr lang="en-AU" sz="3200" b="0">
+                <a:solidFill>
+                  <a:srgbClr val="333333"/>
+                </a:solidFill>
+                <a:latin typeface="Arial" pitchFamily="34" charset="0"/>
+                <a:cs typeface="Arial" pitchFamily="34" charset="0"/>
+              </a:rPr>
+              <a:t>the future, </a:t>
+            </a:r>
+            <a:r>
+              <a:rPr lang="en-AU" sz="3200" b="0" dirty="0">
+                <a:solidFill>
+                  <a:srgbClr val="333333"/>
+                </a:solidFill>
+                <a:latin typeface="Arial" pitchFamily="34" charset="0"/>
+                <a:cs typeface="Arial" pitchFamily="34" charset="0"/>
+              </a:rPr>
+              <a:t>temporal dependencies may be included through the use of different architectures</a:t>
             </a:r>
           </a:p>
           <a:p>
@@ -4221,7 +4264,7 @@
                 <a:latin typeface="Arial" pitchFamily="34" charset="0"/>
                 <a:cs typeface="Arial" pitchFamily="34" charset="0"/>
               </a:rPr>
-              <a:t> complex auditory scenes, recognizing musical objects, forming musical structures and checking alternative hypotheses. Automatic Music Transcription (AMT) refers to the design of computational algorithms to convert acoustic music signals into some form of music notation. It is a challenging task and considered an unsolved problem in signal processing and artificial intelligence. This problem is particularly challenging in polyphonic music were even the most advanced systems are far behind meeting the accuracy of trained musicians. [1]</a:t>
+              <a:t> complex auditory scenes, recognizing musical objects, forming musical structures and checking alternative hypotheses. Automatic Music Transcription (AMT) refers to the design of computational algorithms to convert acoustic music signals into some form of music notation. It is a challenging task and considered an unsolved problem in signal processing and artificial intelligence. This problem is particularly challenging in polyphonic music where even the most advanced systems are far behind meeting the accuracy of trained musicians [1].</a:t>
             </a:r>
             <a:endParaRPr lang="en-AU" sz="3200" b="0" dirty="0">
               <a:solidFill>

</xml_diff>